<commit_message>
major update to exercises 0 and 1
</commit_message>
<xml_diff>
--- a/exercise 0/Exercise 0.pptx
+++ b/exercise 0/Exercise 0.pptx
@@ -305,7 +305,7 @@
           <a:p>
             <a:fld id="{6767C622-365D-4549-80DD-6A61E2992874}" type="datetimeFigureOut">
               <a:rPr lang="en-US" smtClean="0"/>
-              <a:t>1/9/16</a:t>
+              <a:t>1/10/16</a:t>
             </a:fld>
             <a:endParaRPr lang="en-US"/>
           </a:p>
@@ -475,7 +475,7 @@
           <a:p>
             <a:fld id="{6767C622-365D-4549-80DD-6A61E2992874}" type="datetimeFigureOut">
               <a:rPr lang="en-US" smtClean="0"/>
-              <a:t>1/9/16</a:t>
+              <a:t>1/10/16</a:t>
             </a:fld>
             <a:endParaRPr lang="en-US"/>
           </a:p>
@@ -655,7 +655,7 @@
           <a:p>
             <a:fld id="{6767C622-365D-4549-80DD-6A61E2992874}" type="datetimeFigureOut">
               <a:rPr lang="en-US" smtClean="0"/>
-              <a:t>1/9/16</a:t>
+              <a:t>1/10/16</a:t>
             </a:fld>
             <a:endParaRPr lang="en-US"/>
           </a:p>
@@ -825,7 +825,7 @@
           <a:p>
             <a:fld id="{6767C622-365D-4549-80DD-6A61E2992874}" type="datetimeFigureOut">
               <a:rPr lang="en-US" smtClean="0"/>
-              <a:t>1/9/16</a:t>
+              <a:t>1/10/16</a:t>
             </a:fld>
             <a:endParaRPr lang="en-US"/>
           </a:p>
@@ -1071,7 +1071,7 @@
           <a:p>
             <a:fld id="{6767C622-365D-4549-80DD-6A61E2992874}" type="datetimeFigureOut">
               <a:rPr lang="en-US" smtClean="0"/>
-              <a:t>1/9/16</a:t>
+              <a:t>1/10/16</a:t>
             </a:fld>
             <a:endParaRPr lang="en-US"/>
           </a:p>
@@ -1359,7 +1359,7 @@
           <a:p>
             <a:fld id="{6767C622-365D-4549-80DD-6A61E2992874}" type="datetimeFigureOut">
               <a:rPr lang="en-US" smtClean="0"/>
-              <a:t>1/9/16</a:t>
+              <a:t>1/10/16</a:t>
             </a:fld>
             <a:endParaRPr lang="en-US"/>
           </a:p>
@@ -1781,7 +1781,7 @@
           <a:p>
             <a:fld id="{6767C622-365D-4549-80DD-6A61E2992874}" type="datetimeFigureOut">
               <a:rPr lang="en-US" smtClean="0"/>
-              <a:t>1/9/16</a:t>
+              <a:t>1/10/16</a:t>
             </a:fld>
             <a:endParaRPr lang="en-US"/>
           </a:p>
@@ -1899,7 +1899,7 @@
           <a:p>
             <a:fld id="{6767C622-365D-4549-80DD-6A61E2992874}" type="datetimeFigureOut">
               <a:rPr lang="en-US" smtClean="0"/>
-              <a:t>1/9/16</a:t>
+              <a:t>1/10/16</a:t>
             </a:fld>
             <a:endParaRPr lang="en-US"/>
           </a:p>
@@ -1994,7 +1994,7 @@
           <a:p>
             <a:fld id="{6767C622-365D-4549-80DD-6A61E2992874}" type="datetimeFigureOut">
               <a:rPr lang="en-US" smtClean="0"/>
-              <a:t>1/9/16</a:t>
+              <a:t>1/10/16</a:t>
             </a:fld>
             <a:endParaRPr lang="en-US"/>
           </a:p>
@@ -2271,7 +2271,7 @@
           <a:p>
             <a:fld id="{6767C622-365D-4549-80DD-6A61E2992874}" type="datetimeFigureOut">
               <a:rPr lang="en-US" smtClean="0"/>
-              <a:t>1/9/16</a:t>
+              <a:t>1/10/16</a:t>
             </a:fld>
             <a:endParaRPr lang="en-US"/>
           </a:p>
@@ -2527,7 +2527,7 @@
           <a:p>
             <a:fld id="{6767C622-365D-4549-80DD-6A61E2992874}" type="datetimeFigureOut">
               <a:rPr lang="en-US" smtClean="0"/>
-              <a:t>1/9/16</a:t>
+              <a:t>1/10/16</a:t>
             </a:fld>
             <a:endParaRPr lang="en-US"/>
           </a:p>
@@ -2740,7 +2740,7 @@
           <a:p>
             <a:fld id="{6767C622-365D-4549-80DD-6A61E2992874}" type="datetimeFigureOut">
               <a:rPr lang="en-US" smtClean="0"/>
-              <a:t>1/9/16</a:t>
+              <a:t>1/10/16</a:t>
             </a:fld>
             <a:endParaRPr lang="en-US"/>
           </a:p>
@@ -4807,7 +4807,7 @@
         <p:spPr>
           <a:xfrm>
             <a:off x="392798" y="671170"/>
-            <a:ext cx="8432054" cy="5078314"/>
+            <a:ext cx="8432054" cy="5909311"/>
           </a:xfrm>
           <a:prstGeom prst="rect">
             <a:avLst/>
@@ -4825,7 +4825,7 @@
                 <a:latin typeface="Helvetica"/>
                 <a:cs typeface="Helvetica"/>
               </a:rPr>
-              <a:t>To verify everything is working correctly, type the following code in:</a:t>
+              <a:t>To verify everything is working correctly, enter in the code below.  (Don’t worry about understanding what any of it means yet.)</a:t>
             </a:r>
           </a:p>
           <a:p>
@@ -4959,22 +4959,7 @@
                 <a:latin typeface="Helvetica"/>
                 <a:cs typeface="Helvetica"/>
               </a:rPr>
-              <a:t>, your cursor will go to the next line.</a:t>
-            </a:r>
-          </a:p>
-          <a:p>
-            <a:endParaRPr lang="en-US" dirty="0">
-              <a:latin typeface="Helvetica"/>
-              <a:cs typeface="Helvetica"/>
-            </a:endParaRPr>
-          </a:p>
-          <a:p>
-            <a:r>
-              <a:rPr lang="en-US" dirty="0">
-                <a:latin typeface="Helvetica"/>
-                <a:cs typeface="Helvetica"/>
-              </a:rPr>
-              <a:t>To run the code, press </a:t>
+              <a:t>, your cursor will go to the next line.  To run the code, press </a:t>
             </a:r>
             <a:r>
               <a:rPr lang="en-US" dirty="0">
@@ -4989,6 +4974,21 @@
                 <a:cs typeface="Helvetica"/>
               </a:rPr>
               <a:t>.</a:t>
+            </a:r>
+          </a:p>
+          <a:p>
+            <a:endParaRPr lang="en-US" dirty="0">
+              <a:latin typeface="Helvetica"/>
+              <a:cs typeface="Helvetica"/>
+            </a:endParaRPr>
+          </a:p>
+          <a:p>
+            <a:r>
+              <a:rPr lang="en-US" dirty="0">
+                <a:latin typeface="Helvetica"/>
+                <a:cs typeface="Helvetica"/>
+              </a:rPr>
+              <a:t>If you are copying and pasting and have a problem, try removing the blank lines in the code, which may contain some non-printing characters.</a:t>
             </a:r>
           </a:p>
         </p:txBody>
@@ -5067,7 +5067,7 @@
         <p:spPr>
           <a:xfrm>
             <a:off x="392798" y="671170"/>
-            <a:ext cx="8432054" cy="5632312"/>
+            <a:ext cx="8432054" cy="3693319"/>
           </a:xfrm>
           <a:prstGeom prst="rect">
             <a:avLst/>
@@ -5103,71 +5103,24 @@
                 <a:latin typeface="Helvetica"/>
                 <a:cs typeface="Helvetica"/>
               </a:rPr>
-              <a:t>graph.  I highlighted the</a:t>
-            </a:r>
-          </a:p>
-          <a:p>
-            <a:r>
-              <a:rPr lang="en-US" dirty="0">
-                <a:latin typeface="Helvetica"/>
-                <a:cs typeface="Helvetica"/>
-              </a:rPr>
-              <a:t>expected output in red.</a:t>
-            </a:r>
-            <a:endParaRPr lang="en-US" dirty="0">
-              <a:latin typeface="Helvetica"/>
-              <a:cs typeface="Helvetica"/>
-            </a:endParaRPr>
-          </a:p>
-          <a:p>
-            <a:endParaRPr lang="en-US" dirty="0">
-              <a:latin typeface="Helvetica"/>
-              <a:cs typeface="Helvetica"/>
-            </a:endParaRPr>
-          </a:p>
-          <a:p>
-            <a:r>
-              <a:rPr lang="en-US" dirty="0">
-                <a:latin typeface="Helvetica"/>
-                <a:cs typeface="Helvetica"/>
-              </a:rPr>
-              <a:t>Note that copying and</a:t>
-            </a:r>
-          </a:p>
-          <a:p>
-            <a:r>
-              <a:rPr lang="en-US" dirty="0">
-                <a:latin typeface="Helvetica"/>
-                <a:cs typeface="Helvetica"/>
-              </a:rPr>
-              <a:t>pasting the code may not</a:t>
-            </a:r>
-          </a:p>
-          <a:p>
-            <a:r>
-              <a:rPr lang="en-US" dirty="0">
-                <a:latin typeface="Helvetica"/>
-                <a:cs typeface="Helvetica"/>
-              </a:rPr>
-              <a:t>work because of carriage</a:t>
-            </a:r>
-          </a:p>
-          <a:p>
-            <a:r>
-              <a:rPr lang="en-US" dirty="0">
-                <a:latin typeface="Helvetica"/>
-                <a:cs typeface="Helvetica"/>
-              </a:rPr>
-              <a:t>return issues.  Typing it</a:t>
-            </a:r>
-          </a:p>
-          <a:p>
-            <a:r>
-              <a:rPr lang="en-US" dirty="0">
-                <a:latin typeface="Helvetica"/>
-                <a:cs typeface="Helvetica"/>
-              </a:rPr>
-              <a:t>directly should work.</a:t>
+              <a:t>graph (highlighted in </a:t>
+            </a:r>
+            <a:r>
+              <a:rPr lang="en-US" dirty="0">
+                <a:solidFill>
+                  <a:srgbClr val="FF0000"/>
+                </a:solidFill>
+                <a:latin typeface="Helvetica"/>
+                <a:cs typeface="Helvetica"/>
+              </a:rPr>
+              <a:t>red</a:t>
+            </a:r>
+            <a:r>
+              <a:rPr lang="en-US" dirty="0">
+                <a:latin typeface="Helvetica"/>
+                <a:cs typeface="Helvetica"/>
+              </a:rPr>
+              <a:t>).</a:t>
             </a:r>
           </a:p>
           <a:p>
@@ -5200,25 +5153,32 @@
                 <a:latin typeface="Helvetica"/>
                 <a:cs typeface="Helvetica"/>
               </a:rPr>
-              <a:t>more code in there, or</a:t>
-            </a:r>
-          </a:p>
-          <a:p>
-            <a:r>
-              <a:rPr lang="en-US" dirty="0">
-                <a:latin typeface="Helvetica"/>
-                <a:cs typeface="Helvetica"/>
-              </a:rPr>
-              <a:t>change the code you just</a:t>
-            </a:r>
-          </a:p>
-          <a:p>
-            <a:r>
-              <a:rPr lang="en-US" dirty="0">
-                <a:latin typeface="Helvetica"/>
-                <a:cs typeface="Helvetica"/>
-              </a:rPr>
-              <a:t>wrote and run it again.</a:t>
+              <a:t>in more code</a:t>
+            </a:r>
+            <a:r>
+              <a:rPr lang="en-US" dirty="0">
+                <a:latin typeface="Helvetica"/>
+                <a:cs typeface="Helvetica"/>
+              </a:rPr>
+              <a:t>, or change</a:t>
+            </a:r>
+          </a:p>
+          <a:p>
+            <a:r>
+              <a:rPr lang="en-US" dirty="0">
+                <a:latin typeface="Helvetica"/>
+                <a:cs typeface="Helvetica"/>
+              </a:rPr>
+              <a:t>the code you just wrote</a:t>
+            </a:r>
+          </a:p>
+          <a:p>
+            <a:r>
+              <a:rPr lang="en-US" dirty="0">
+                <a:latin typeface="Helvetica"/>
+                <a:cs typeface="Helvetica"/>
+              </a:rPr>
+              <a:t>and run it again.</a:t>
             </a:r>
           </a:p>
           <a:p>
@@ -5387,13 +5347,6 @@
               </a:rPr>
               <a:t>The Working Directory (Local)</a:t>
             </a:r>
-            <a:endParaRPr lang="en-US" sz="2400" dirty="0">
-              <a:solidFill>
-                <a:srgbClr val="0000FF"/>
-              </a:solidFill>
-              <a:latin typeface="Helvetica"/>
-              <a:cs typeface="Helvetica"/>
-            </a:endParaRPr>
           </a:p>
         </p:txBody>
       </p:sp>
@@ -5519,7 +5472,7 @@
                 <a:latin typeface="Courier New"/>
                 <a:cs typeface="Courier New"/>
               </a:rPr>
-              <a:t>cd C:\mypath\ </a:t>
+              <a:t>cd C:\some_directory\ </a:t>
             </a:r>
             <a:r>
               <a:rPr lang="en-US" dirty="0">
@@ -5751,13 +5704,6 @@
               </a:rPr>
               <a:t>The Working Directory (Wakari)</a:t>
             </a:r>
-            <a:endParaRPr lang="en-US" sz="2400" dirty="0">
-              <a:solidFill>
-                <a:srgbClr val="0000FF"/>
-              </a:solidFill>
-              <a:latin typeface="Helvetica"/>
-              <a:cs typeface="Helvetica"/>
-            </a:endParaRPr>
           </a:p>
         </p:txBody>
       </p:sp>
@@ -6917,17 +6863,7 @@
                 <a:latin typeface="Helvetica"/>
                 <a:cs typeface="Helvetica"/>
               </a:rPr>
-              <a:t>Option 3: </a:t>
-            </a:r>
-            <a:r>
-              <a:rPr lang="en-US" dirty="0">
-                <a:solidFill>
-                  <a:srgbClr val="0000FF"/>
-                </a:solidFill>
-                <a:latin typeface="Helvetica"/>
-                <a:cs typeface="Helvetica"/>
-              </a:rPr>
-              <a:t>Run Locally with a Text Editor (advanced)</a:t>
+              <a:t>Option 3: Run Locally with a Text Editor (advanced)</a:t>
             </a:r>
           </a:p>
           <a:p>
@@ -8092,10 +8028,6 @@
               </a:rPr>
               <a:t>Start the prompt.  A black console will open.</a:t>
             </a:r>
-            <a:endParaRPr lang="en-US" dirty="0">
-              <a:latin typeface="Helvetica"/>
-              <a:cs typeface="Helvetica"/>
-            </a:endParaRPr>
           </a:p>
         </p:txBody>
       </p:sp>
@@ -8313,7 +8245,15 @@
                 <a:latin typeface="Helvetica"/>
                 <a:cs typeface="Helvetica"/>
               </a:rPr>
-              <a:t>IPython Notebook will start in your browser.  If it doesn’t, navigate to</a:t>
+              <a:t>IPython Notebook will start in your browser.  If it doesn’t, navigate to </a:t>
+            </a:r>
+            <a:r>
+              <a:rPr lang="en-US" dirty="0">
+                <a:latin typeface="Helvetica"/>
+                <a:cs typeface="Helvetica"/>
+                <a:hlinkClick r:id="rId2"/>
+              </a:rPr>
+              <a:t>http://localhost:8888/</a:t>
             </a:r>
             <a:r>
               <a:rPr lang="en-US" dirty="0">
@@ -8322,25 +8262,6 @@
               </a:rPr>
               <a:t> </a:t>
             </a:r>
-            <a:r>
-              <a:rPr lang="en-US" dirty="0">
-                <a:latin typeface="Helvetica"/>
-                <a:cs typeface="Helvetica"/>
-                <a:hlinkClick r:id="rId2"/>
-              </a:rPr>
-              <a:t>http://localhost:8888/</a:t>
-            </a:r>
-            <a:r>
-              <a:rPr lang="en-US" dirty="0">
-                <a:latin typeface="Helvetica"/>
-                <a:cs typeface="Helvetica"/>
-              </a:rPr>
-              <a:t> </a:t>
-            </a:r>
-            <a:endParaRPr lang="en-US" dirty="0">
-              <a:latin typeface="Helvetica"/>
-              <a:cs typeface="Helvetica"/>
-            </a:endParaRPr>
           </a:p>
         </p:txBody>
       </p:sp>

</xml_diff>